<commit_message>
Update UG and DG
</commit_message>
<xml_diff>
--- a/docs/diagrams/LogicComponentCommandClassDiagram.pptx
+++ b/docs/diagrams/LogicComponentCommandClassDiagram.pptx
@@ -5,10 +5,11 @@
     <p:sldMasterId id="2147483648" r:id="rId1"/>
   </p:sldMasterIdLst>
   <p:notesMasterIdLst>
-    <p:notesMasterId r:id="rId3"/>
+    <p:notesMasterId r:id="rId4"/>
   </p:notesMasterIdLst>
   <p:sldIdLst>
     <p:sldId id="262" r:id="rId2"/>
+    <p:sldId id="263" r:id="rId3"/>
   </p:sldIdLst>
   <p:sldSz cx="9144000" cy="6858000" type="screen4x3"/>
   <p:notesSz cx="6858000" cy="9144000"/>
@@ -212,7 +213,7 @@
           <a:p>
             <a:fld id="{F5CC4B3F-88C1-4FFA-B1B6-F41C21DC6924}" type="datetimeFigureOut">
               <a:rPr lang="en-US" smtClean="0"/>
-              <a:t>7/21/17</a:t>
+              <a:t>10/31/2017</a:t>
             </a:fld>
             <a:endParaRPr lang="en-US"/>
           </a:p>
@@ -658,7 +659,7 @@
           <a:p>
             <a:fld id="{78C97017-6FC3-485B-9764-EAC9E56C1D49}" type="datetimeFigureOut">
               <a:rPr lang="en-US" smtClean="0"/>
-              <a:t>7/21/17</a:t>
+              <a:t>10/31/2017</a:t>
             </a:fld>
             <a:endParaRPr lang="en-US"/>
           </a:p>
@@ -826,7 +827,7 @@
           <a:p>
             <a:fld id="{78C97017-6FC3-485B-9764-EAC9E56C1D49}" type="datetimeFigureOut">
               <a:rPr lang="en-US" smtClean="0"/>
-              <a:t>7/21/17</a:t>
+              <a:t>10/31/2017</a:t>
             </a:fld>
             <a:endParaRPr lang="en-US"/>
           </a:p>
@@ -1004,7 +1005,7 @@
           <a:p>
             <a:fld id="{78C97017-6FC3-485B-9764-EAC9E56C1D49}" type="datetimeFigureOut">
               <a:rPr lang="en-US" smtClean="0"/>
-              <a:t>7/21/17</a:t>
+              <a:t>10/31/2017</a:t>
             </a:fld>
             <a:endParaRPr lang="en-US"/>
           </a:p>
@@ -1172,7 +1173,7 @@
           <a:p>
             <a:fld id="{78C97017-6FC3-485B-9764-EAC9E56C1D49}" type="datetimeFigureOut">
               <a:rPr lang="en-US" smtClean="0"/>
-              <a:t>7/21/17</a:t>
+              <a:t>10/31/2017</a:t>
             </a:fld>
             <a:endParaRPr lang="en-US"/>
           </a:p>
@@ -1417,7 +1418,7 @@
           <a:p>
             <a:fld id="{78C97017-6FC3-485B-9764-EAC9E56C1D49}" type="datetimeFigureOut">
               <a:rPr lang="en-US" smtClean="0"/>
-              <a:t>7/21/17</a:t>
+              <a:t>10/31/2017</a:t>
             </a:fld>
             <a:endParaRPr lang="en-US"/>
           </a:p>
@@ -1702,7 +1703,7 @@
           <a:p>
             <a:fld id="{78C97017-6FC3-485B-9764-EAC9E56C1D49}" type="datetimeFigureOut">
               <a:rPr lang="en-US" smtClean="0"/>
-              <a:t>7/21/17</a:t>
+              <a:t>10/31/2017</a:t>
             </a:fld>
             <a:endParaRPr lang="en-US"/>
           </a:p>
@@ -2121,7 +2122,7 @@
           <a:p>
             <a:fld id="{78C97017-6FC3-485B-9764-EAC9E56C1D49}" type="datetimeFigureOut">
               <a:rPr lang="en-US" smtClean="0"/>
-              <a:t>7/21/17</a:t>
+              <a:t>10/31/2017</a:t>
             </a:fld>
             <a:endParaRPr lang="en-US"/>
           </a:p>
@@ -2238,7 +2239,7 @@
           <a:p>
             <a:fld id="{78C97017-6FC3-485B-9764-EAC9E56C1D49}" type="datetimeFigureOut">
               <a:rPr lang="en-US" smtClean="0"/>
-              <a:t>7/21/17</a:t>
+              <a:t>10/31/2017</a:t>
             </a:fld>
             <a:endParaRPr lang="en-US"/>
           </a:p>
@@ -2333,7 +2334,7 @@
           <a:p>
             <a:fld id="{78C97017-6FC3-485B-9764-EAC9E56C1D49}" type="datetimeFigureOut">
               <a:rPr lang="en-US" smtClean="0"/>
-              <a:t>7/21/17</a:t>
+              <a:t>10/31/2017</a:t>
             </a:fld>
             <a:endParaRPr lang="en-US"/>
           </a:p>
@@ -2608,7 +2609,7 @@
           <a:p>
             <a:fld id="{78C97017-6FC3-485B-9764-EAC9E56C1D49}" type="datetimeFigureOut">
               <a:rPr lang="en-US" smtClean="0"/>
-              <a:t>7/21/17</a:t>
+              <a:t>10/31/2017</a:t>
             </a:fld>
             <a:endParaRPr lang="en-US"/>
           </a:p>
@@ -2860,7 +2861,7 @@
           <a:p>
             <a:fld id="{78C97017-6FC3-485B-9764-EAC9E56C1D49}" type="datetimeFigureOut">
               <a:rPr lang="en-US" smtClean="0"/>
-              <a:t>7/21/17</a:t>
+              <a:t>10/31/2017</a:t>
             </a:fld>
             <a:endParaRPr lang="en-US"/>
           </a:p>
@@ -3071,7 +3072,7 @@
           <a:p>
             <a:fld id="{78C97017-6FC3-485B-9764-EAC9E56C1D49}" type="datetimeFigureOut">
               <a:rPr lang="en-US" smtClean="0"/>
-              <a:t>7/21/17</a:t>
+              <a:t>10/31/2017</a:t>
             </a:fld>
             <a:endParaRPr lang="en-US"/>
           </a:p>
@@ -3718,14 +3719,6 @@
               </a:rPr>
               <a:t>{abstract}</a:t>
             </a:r>
-            <a:r>
-              <a:rPr lang="en-US" sz="1050" b="1">
-                <a:solidFill>
-                  <a:srgbClr val="0070C0"/>
-                </a:solidFill>
-              </a:rPr>
-              <a:t/>
-            </a:r>
             <a:br>
               <a:rPr lang="en-US" sz="1050" b="1">
                 <a:solidFill>
@@ -3734,7 +3727,7 @@
               </a:rPr>
             </a:br>
             <a:r>
-              <a:rPr lang="en-US" sz="1050" b="1" smtClean="0">
+              <a:rPr lang="en-US" sz="1050" b="1">
                 <a:solidFill>
                   <a:srgbClr val="0070C0"/>
                 </a:solidFill>
@@ -3745,7 +3738,7 @@
           <a:p>
             <a:pPr algn="ctr"/>
             <a:r>
-              <a:rPr lang="en-US" sz="1050" b="1" dirty="0" smtClean="0">
+              <a:rPr lang="en-US" sz="1050" b="1" dirty="0">
                 <a:solidFill>
                   <a:srgbClr val="0070C0"/>
                 </a:solidFill>
@@ -3894,7 +3887,7 @@
           <a:p>
             <a:pPr algn="ctr"/>
             <a:r>
-              <a:rPr lang="en-US" sz="1050" b="1" smtClean="0">
+              <a:rPr lang="en-US" sz="1050" b="1">
                 <a:solidFill>
                   <a:srgbClr val="0070C0"/>
                 </a:solidFill>
@@ -3950,7 +3943,7 @@
           <a:p>
             <a:pPr algn="ctr"/>
             <a:r>
-              <a:rPr lang="en-US" sz="1050" b="1" dirty="0" err="1" smtClean="0">
+              <a:rPr lang="en-US" sz="1050" b="1" dirty="0" err="1">
                 <a:solidFill>
                   <a:srgbClr val="0070C0"/>
                 </a:solidFill>
@@ -4006,7 +3999,7 @@
           <a:p>
             <a:pPr algn="ctr"/>
             <a:r>
-              <a:rPr lang="mr-IN" sz="1050" b="1" dirty="0" smtClean="0">
+              <a:rPr lang="mr-IN" sz="1050" b="1" dirty="0">
                 <a:solidFill>
                   <a:srgbClr val="0070C0"/>
                 </a:solidFill>
@@ -4233,7 +4226,7 @@
           <a:p>
             <a:pPr algn="ctr"/>
             <a:r>
-              <a:rPr lang="en-US" sz="1050" b="1" smtClean="0">
+              <a:rPr lang="en-US" sz="1050" b="1">
                 <a:solidFill>
                   <a:srgbClr val="0070C0"/>
                 </a:solidFill>
@@ -4289,7 +4282,7 @@
           <a:p>
             <a:pPr algn="ctr"/>
             <a:r>
-              <a:rPr lang="en-US" sz="1050" b="1" dirty="0" err="1" smtClean="0">
+              <a:rPr lang="en-US" sz="1050" b="1" dirty="0" err="1">
                 <a:solidFill>
                   <a:srgbClr val="0070C0"/>
                 </a:solidFill>
@@ -4384,7 +4377,7 @@
           <a:p>
             <a:pPr algn="ctr"/>
             <a:r>
-              <a:rPr lang="mr-IN" sz="1050" b="1" dirty="0" smtClean="0">
+              <a:rPr lang="mr-IN" sz="1050" b="1" dirty="0">
                 <a:solidFill>
                   <a:srgbClr val="0070C0"/>
                 </a:solidFill>
@@ -4533,7 +4526,7 @@
           <a:p>
             <a:pPr algn="ctr"/>
             <a:r>
-              <a:rPr lang="en-US" sz="1050" b="1" dirty="0" err="1" smtClean="0">
+              <a:rPr lang="en-US" sz="1050" b="1" dirty="0" err="1">
                 <a:solidFill>
                   <a:srgbClr val="0070C0"/>
                 </a:solidFill>
@@ -4755,6 +4748,343 @@
     <p:extLst>
       <p:ext uri="{BB962C8B-B14F-4D97-AF65-F5344CB8AC3E}">
         <p14:creationId xmlns:p14="http://schemas.microsoft.com/office/powerpoint/2010/main" val="211586602"/>
+      </p:ext>
+    </p:extLst>
+  </p:cSld>
+  <p:clrMapOvr>
+    <a:masterClrMapping/>
+  </p:clrMapOvr>
+</p:sld>
+</file>
+
+<file path=ppt/slides/slide2.xml><?xml version="1.0" encoding="utf-8"?>
+<p:sld xmlns:a="http://schemas.openxmlformats.org/drawingml/2006/main" xmlns:r="http://schemas.openxmlformats.org/officeDocument/2006/relationships" xmlns:p="http://schemas.openxmlformats.org/presentationml/2006/main">
+  <p:cSld>
+    <p:spTree>
+      <p:nvGrpSpPr>
+        <p:cNvPr id="1" name=""/>
+        <p:cNvGrpSpPr/>
+        <p:nvPr/>
+      </p:nvGrpSpPr>
+      <p:grpSpPr>
+        <a:xfrm>
+          <a:off x="0" y="0"/>
+          <a:ext cx="0" cy="0"/>
+          <a:chOff x="0" y="0"/>
+          <a:chExt cx="0" cy="0"/>
+        </a:xfrm>
+      </p:grpSpPr>
+      <p:sp>
+        <p:nvSpPr>
+          <p:cNvPr id="3" name="Rectangle 65">
+            <a:extLst>
+              <a:ext uri="{FF2B5EF4-FFF2-40B4-BE49-F238E27FC236}">
+                <a16:creationId xmlns:a16="http://schemas.microsoft.com/office/drawing/2014/main" id="{50F43D07-3B7C-461A-A129-C563CD9C7AD5}"/>
+              </a:ext>
+            </a:extLst>
+          </p:cNvPr>
+          <p:cNvSpPr/>
+          <p:nvPr/>
+        </p:nvSpPr>
+        <p:spPr>
+          <a:xfrm>
+            <a:off x="1828800" y="1667338"/>
+            <a:ext cx="5410200" cy="2523662"/>
+          </a:xfrm>
+          <a:prstGeom prst="roundRect">
+            <a:avLst>
+              <a:gd name="adj" fmla="val 3484"/>
+            </a:avLst>
+          </a:prstGeom>
+          <a:solidFill>
+            <a:schemeClr val="accent1">
+              <a:lumMod val="20000"/>
+              <a:lumOff val="80000"/>
+            </a:schemeClr>
+          </a:solidFill>
+          <a:ln w="19050">
+            <a:noFill/>
+          </a:ln>
+          <a:effectLst/>
+        </p:spPr>
+        <p:style>
+          <a:lnRef idx="1">
+            <a:schemeClr val="accent2"/>
+          </a:lnRef>
+          <a:fillRef idx="2">
+            <a:schemeClr val="accent2"/>
+          </a:fillRef>
+          <a:effectRef idx="1">
+            <a:schemeClr val="accent2"/>
+          </a:effectRef>
+          <a:fontRef idx="minor">
+            <a:schemeClr val="dk1"/>
+          </a:fontRef>
+        </p:style>
+        <p:txBody>
+          <a:bodyPr rtlCol="0" anchor="t"/>
+          <a:lstStyle/>
+          <a:p>
+            <a:r>
+              <a:rPr lang="en-US" sz="1200" b="1" dirty="0">
+                <a:solidFill>
+                  <a:srgbClr val="0070C0"/>
+                </a:solidFill>
+              </a:rPr>
+              <a:t>UI</a:t>
+            </a:r>
+            <a:endParaRPr lang="en-SG" sz="1200" b="1" dirty="0">
+              <a:solidFill>
+                <a:srgbClr val="0070C0"/>
+              </a:solidFill>
+            </a:endParaRPr>
+          </a:p>
+        </p:txBody>
+      </p:sp>
+      <p:cxnSp>
+        <p:nvCxnSpPr>
+          <p:cNvPr id="5" name="Elbow Connector 95">
+            <a:extLst>
+              <a:ext uri="{FF2B5EF4-FFF2-40B4-BE49-F238E27FC236}">
+                <a16:creationId xmlns:a16="http://schemas.microsoft.com/office/drawing/2014/main" id="{AD9FDF45-FDBC-4875-96F7-03833ADB367A}"/>
+              </a:ext>
+            </a:extLst>
+          </p:cNvPr>
+          <p:cNvCxnSpPr>
+            <a:cxnSpLocks/>
+            <a:stCxn id="21" idx="3"/>
+          </p:cNvCxnSpPr>
+          <p:nvPr/>
+        </p:nvCxnSpPr>
+        <p:spPr>
+          <a:xfrm rot="10800000">
+            <a:off x="3581398" y="2846835"/>
+            <a:ext cx="1802503" cy="5787"/>
+          </a:xfrm>
+          <a:prstGeom prst="bentConnector3">
+            <a:avLst>
+              <a:gd name="adj1" fmla="val 50000"/>
+            </a:avLst>
+          </a:prstGeom>
+          <a:ln w="19050">
+            <a:headEnd type="none" w="med" len="med"/>
+            <a:tailEnd type="none" w="med" len="med"/>
+          </a:ln>
+        </p:spPr>
+        <p:style>
+          <a:lnRef idx="1">
+            <a:schemeClr val="accent1"/>
+          </a:lnRef>
+          <a:fillRef idx="0">
+            <a:schemeClr val="accent1"/>
+          </a:fillRef>
+          <a:effectRef idx="0">
+            <a:schemeClr val="accent1"/>
+          </a:effectRef>
+          <a:fontRef idx="minor">
+            <a:schemeClr val="tx1"/>
+          </a:fontRef>
+        </p:style>
+      </p:cxnSp>
+      <p:sp>
+        <p:nvSpPr>
+          <p:cNvPr id="16" name="Rectangle 11">
+            <a:extLst>
+              <a:ext uri="{FF2B5EF4-FFF2-40B4-BE49-F238E27FC236}">
+                <a16:creationId xmlns:a16="http://schemas.microsoft.com/office/drawing/2014/main" id="{50111C96-48AF-47D0-BB8C-97B8E0B4BD2F}"/>
+              </a:ext>
+            </a:extLst>
+          </p:cNvPr>
+          <p:cNvSpPr/>
+          <p:nvPr/>
+        </p:nvSpPr>
+        <p:spPr>
+          <a:xfrm flipH="1">
+            <a:off x="2110135" y="2667000"/>
+            <a:ext cx="1471264" cy="434423"/>
+          </a:xfrm>
+          <a:prstGeom prst="rect">
+            <a:avLst/>
+          </a:prstGeom>
+          <a:ln w="19050">
+            <a:solidFill>
+              <a:srgbClr val="0070C0"/>
+            </a:solidFill>
+          </a:ln>
+          <a:effectLst/>
+        </p:spPr>
+        <p:style>
+          <a:lnRef idx="1">
+            <a:schemeClr val="accent1"/>
+          </a:lnRef>
+          <a:fillRef idx="2">
+            <a:schemeClr val="accent1"/>
+          </a:fillRef>
+          <a:effectRef idx="1">
+            <a:schemeClr val="accent1"/>
+          </a:effectRef>
+          <a:fontRef idx="minor">
+            <a:schemeClr val="dk1"/>
+          </a:fontRef>
+        </p:style>
+        <p:txBody>
+          <a:bodyPr rtlCol="0" anchor="ctr"/>
+          <a:lstStyle/>
+          <a:p>
+            <a:pPr algn="ctr"/>
+            <a:r>
+              <a:rPr lang="en-US" sz="1050" b="1" dirty="0" err="1">
+                <a:solidFill>
+                  <a:srgbClr val="0070C0"/>
+                </a:solidFill>
+              </a:rPr>
+              <a:t>BirthdayStatisticsPanel</a:t>
+            </a:r>
+            <a:endParaRPr lang="en-US" sz="1050" b="1" dirty="0">
+              <a:solidFill>
+                <a:srgbClr val="0070C0"/>
+              </a:solidFill>
+            </a:endParaRPr>
+          </a:p>
+        </p:txBody>
+      </p:sp>
+      <p:sp>
+        <p:nvSpPr>
+          <p:cNvPr id="19" name="Rectangle 11">
+            <a:extLst>
+              <a:ext uri="{FF2B5EF4-FFF2-40B4-BE49-F238E27FC236}">
+                <a16:creationId xmlns:a16="http://schemas.microsoft.com/office/drawing/2014/main" id="{C8476C99-0F04-40C8-BFB1-165B0AC4C06F}"/>
+              </a:ext>
+            </a:extLst>
+          </p:cNvPr>
+          <p:cNvSpPr/>
+          <p:nvPr/>
+        </p:nvSpPr>
+        <p:spPr>
+          <a:xfrm flipH="1">
+            <a:off x="5628610" y="2667000"/>
+            <a:ext cx="1175194" cy="359669"/>
+          </a:xfrm>
+          <a:prstGeom prst="rect">
+            <a:avLst/>
+          </a:prstGeom>
+          <a:ln w="19050">
+            <a:solidFill>
+              <a:srgbClr val="0070C0"/>
+            </a:solidFill>
+          </a:ln>
+          <a:effectLst/>
+        </p:spPr>
+        <p:style>
+          <a:lnRef idx="1">
+            <a:schemeClr val="accent1"/>
+          </a:lnRef>
+          <a:fillRef idx="2">
+            <a:schemeClr val="accent1"/>
+          </a:fillRef>
+          <a:effectRef idx="1">
+            <a:schemeClr val="accent1"/>
+          </a:effectRef>
+          <a:fontRef idx="minor">
+            <a:schemeClr val="dk1"/>
+          </a:fontRef>
+        </p:style>
+        <p:txBody>
+          <a:bodyPr rtlCol="0" anchor="ctr"/>
+          <a:lstStyle/>
+          <a:p>
+            <a:pPr algn="ctr"/>
+            <a:r>
+              <a:rPr lang="en-SG" sz="1050" b="1" dirty="0">
+                <a:solidFill>
+                  <a:srgbClr val="0070C0"/>
+                </a:solidFill>
+              </a:rPr>
+              <a:t>{abstract}</a:t>
+            </a:r>
+          </a:p>
+          <a:p>
+            <a:pPr algn="ctr"/>
+            <a:r>
+              <a:rPr lang="en-SG" sz="1050" b="1" dirty="0" err="1">
+                <a:solidFill>
+                  <a:srgbClr val="0070C0"/>
+                </a:solidFill>
+              </a:rPr>
+              <a:t>UiPart</a:t>
+            </a:r>
+            <a:endParaRPr lang="en-US" sz="1050" b="1" dirty="0">
+              <a:solidFill>
+                <a:srgbClr val="0070C0"/>
+              </a:solidFill>
+            </a:endParaRPr>
+          </a:p>
+        </p:txBody>
+      </p:sp>
+      <p:sp>
+        <p:nvSpPr>
+          <p:cNvPr id="21" name="Isosceles Triangle 102">
+            <a:extLst>
+              <a:ext uri="{FF2B5EF4-FFF2-40B4-BE49-F238E27FC236}">
+                <a16:creationId xmlns:a16="http://schemas.microsoft.com/office/drawing/2014/main" id="{B2876B6D-F3D6-4937-AFDB-EE4ACF802C6D}"/>
+              </a:ext>
+            </a:extLst>
+          </p:cNvPr>
+          <p:cNvSpPr/>
+          <p:nvPr/>
+        </p:nvSpPr>
+        <p:spPr>
+          <a:xfrm rot="16200000" flipV="1">
+            <a:off x="5336409" y="2764859"/>
+            <a:ext cx="270504" cy="175523"/>
+          </a:xfrm>
+          <a:prstGeom prst="triangle">
+            <a:avLst/>
+          </a:prstGeom>
+          <a:solidFill>
+            <a:schemeClr val="tx2">
+              <a:lumMod val="60000"/>
+              <a:lumOff val="40000"/>
+            </a:schemeClr>
+          </a:solidFill>
+          <a:ln w="19050">
+            <a:solidFill>
+              <a:srgbClr val="0070C0"/>
+            </a:solidFill>
+          </a:ln>
+          <a:effectLst/>
+        </p:spPr>
+        <p:style>
+          <a:lnRef idx="1">
+            <a:schemeClr val="accent1"/>
+          </a:lnRef>
+          <a:fillRef idx="2">
+            <a:schemeClr val="accent1"/>
+          </a:fillRef>
+          <a:effectRef idx="1">
+            <a:schemeClr val="accent1"/>
+          </a:effectRef>
+          <a:fontRef idx="minor">
+            <a:schemeClr val="dk1"/>
+          </a:fontRef>
+        </p:style>
+        <p:txBody>
+          <a:bodyPr rtlCol="0" anchor="ctr"/>
+          <a:lstStyle/>
+          <a:p>
+            <a:pPr algn="ctr"/>
+            <a:endParaRPr lang="en-SG" sz="1050" b="1">
+              <a:solidFill>
+                <a:srgbClr val="92D050"/>
+              </a:solidFill>
+            </a:endParaRPr>
+          </a:p>
+        </p:txBody>
+      </p:sp>
+    </p:spTree>
+    <p:extLst>
+      <p:ext uri="{BB962C8B-B14F-4D97-AF65-F5344CB8AC3E}">
+        <p14:creationId xmlns:p14="http://schemas.microsoft.com/office/powerpoint/2010/main" val="2207275622"/>
       </p:ext>
     </p:extLst>
   </p:cSld>

</xml_diff>

<commit_message>
DeveloperGuide: Update to v1.5
</commit_message>
<xml_diff>
--- a/docs/diagrams/LogicComponentCommandClassDiagram.pptx
+++ b/docs/diagrams/LogicComponentCommandClassDiagram.pptx
@@ -5,11 +5,10 @@
     <p:sldMasterId id="2147483648" r:id="rId1"/>
   </p:sldMasterIdLst>
   <p:notesMasterIdLst>
-    <p:notesMasterId r:id="rId4"/>
+    <p:notesMasterId r:id="rId3"/>
   </p:notesMasterIdLst>
   <p:sldIdLst>
     <p:sldId id="262" r:id="rId2"/>
-    <p:sldId id="263" r:id="rId3"/>
   </p:sldIdLst>
   <p:sldSz cx="9144000" cy="6858000" type="screen4x3"/>
   <p:notesSz cx="6858000" cy="9144000"/>
@@ -213,7 +212,7 @@
           <a:p>
             <a:fld id="{F5CC4B3F-88C1-4FFA-B1B6-F41C21DC6924}" type="datetimeFigureOut">
               <a:rPr lang="en-US" smtClean="0"/>
-              <a:t>10/31/2017</a:t>
+              <a:t>11/13/2017</a:t>
             </a:fld>
             <a:endParaRPr lang="en-US"/>
           </a:p>
@@ -659,7 +658,7 @@
           <a:p>
             <a:fld id="{78C97017-6FC3-485B-9764-EAC9E56C1D49}" type="datetimeFigureOut">
               <a:rPr lang="en-US" smtClean="0"/>
-              <a:t>10/31/2017</a:t>
+              <a:t>11/13/2017</a:t>
             </a:fld>
             <a:endParaRPr lang="en-US"/>
           </a:p>
@@ -827,7 +826,7 @@
           <a:p>
             <a:fld id="{78C97017-6FC3-485B-9764-EAC9E56C1D49}" type="datetimeFigureOut">
               <a:rPr lang="en-US" smtClean="0"/>
-              <a:t>10/31/2017</a:t>
+              <a:t>11/13/2017</a:t>
             </a:fld>
             <a:endParaRPr lang="en-US"/>
           </a:p>
@@ -1005,7 +1004,7 @@
           <a:p>
             <a:fld id="{78C97017-6FC3-485B-9764-EAC9E56C1D49}" type="datetimeFigureOut">
               <a:rPr lang="en-US" smtClean="0"/>
-              <a:t>10/31/2017</a:t>
+              <a:t>11/13/2017</a:t>
             </a:fld>
             <a:endParaRPr lang="en-US"/>
           </a:p>
@@ -1173,7 +1172,7 @@
           <a:p>
             <a:fld id="{78C97017-6FC3-485B-9764-EAC9E56C1D49}" type="datetimeFigureOut">
               <a:rPr lang="en-US" smtClean="0"/>
-              <a:t>10/31/2017</a:t>
+              <a:t>11/13/2017</a:t>
             </a:fld>
             <a:endParaRPr lang="en-US"/>
           </a:p>
@@ -1418,7 +1417,7 @@
           <a:p>
             <a:fld id="{78C97017-6FC3-485B-9764-EAC9E56C1D49}" type="datetimeFigureOut">
               <a:rPr lang="en-US" smtClean="0"/>
-              <a:t>10/31/2017</a:t>
+              <a:t>11/13/2017</a:t>
             </a:fld>
             <a:endParaRPr lang="en-US"/>
           </a:p>
@@ -1703,7 +1702,7 @@
           <a:p>
             <a:fld id="{78C97017-6FC3-485B-9764-EAC9E56C1D49}" type="datetimeFigureOut">
               <a:rPr lang="en-US" smtClean="0"/>
-              <a:t>10/31/2017</a:t>
+              <a:t>11/13/2017</a:t>
             </a:fld>
             <a:endParaRPr lang="en-US"/>
           </a:p>
@@ -2122,7 +2121,7 @@
           <a:p>
             <a:fld id="{78C97017-6FC3-485B-9764-EAC9E56C1D49}" type="datetimeFigureOut">
               <a:rPr lang="en-US" smtClean="0"/>
-              <a:t>10/31/2017</a:t>
+              <a:t>11/13/2017</a:t>
             </a:fld>
             <a:endParaRPr lang="en-US"/>
           </a:p>
@@ -2239,7 +2238,7 @@
           <a:p>
             <a:fld id="{78C97017-6FC3-485B-9764-EAC9E56C1D49}" type="datetimeFigureOut">
               <a:rPr lang="en-US" smtClean="0"/>
-              <a:t>10/31/2017</a:t>
+              <a:t>11/13/2017</a:t>
             </a:fld>
             <a:endParaRPr lang="en-US"/>
           </a:p>
@@ -2334,7 +2333,7 @@
           <a:p>
             <a:fld id="{78C97017-6FC3-485B-9764-EAC9E56C1D49}" type="datetimeFigureOut">
               <a:rPr lang="en-US" smtClean="0"/>
-              <a:t>10/31/2017</a:t>
+              <a:t>11/13/2017</a:t>
             </a:fld>
             <a:endParaRPr lang="en-US"/>
           </a:p>
@@ -2609,7 +2608,7 @@
           <a:p>
             <a:fld id="{78C97017-6FC3-485B-9764-EAC9E56C1D49}" type="datetimeFigureOut">
               <a:rPr lang="en-US" smtClean="0"/>
-              <a:t>10/31/2017</a:t>
+              <a:t>11/13/2017</a:t>
             </a:fld>
             <a:endParaRPr lang="en-US"/>
           </a:p>
@@ -2861,7 +2860,7 @@
           <a:p>
             <a:fld id="{78C97017-6FC3-485B-9764-EAC9E56C1D49}" type="datetimeFigureOut">
               <a:rPr lang="en-US" smtClean="0"/>
-              <a:t>10/31/2017</a:t>
+              <a:t>11/13/2017</a:t>
             </a:fld>
             <a:endParaRPr lang="en-US"/>
           </a:p>
@@ -3072,7 +3071,7 @@
           <a:p>
             <a:fld id="{78C97017-6FC3-485B-9764-EAC9E56C1D49}" type="datetimeFigureOut">
               <a:rPr lang="en-US" smtClean="0"/>
-              <a:t>10/31/2017</a:t>
+              <a:t>11/13/2017</a:t>
             </a:fld>
             <a:endParaRPr lang="en-US"/>
           </a:p>
@@ -4748,343 +4747,6 @@
     <p:extLst>
       <p:ext uri="{BB962C8B-B14F-4D97-AF65-F5344CB8AC3E}">
         <p14:creationId xmlns:p14="http://schemas.microsoft.com/office/powerpoint/2010/main" val="211586602"/>
-      </p:ext>
-    </p:extLst>
-  </p:cSld>
-  <p:clrMapOvr>
-    <a:masterClrMapping/>
-  </p:clrMapOvr>
-</p:sld>
-</file>
-
-<file path=ppt/slides/slide2.xml><?xml version="1.0" encoding="utf-8"?>
-<p:sld xmlns:a="http://schemas.openxmlformats.org/drawingml/2006/main" xmlns:r="http://schemas.openxmlformats.org/officeDocument/2006/relationships" xmlns:p="http://schemas.openxmlformats.org/presentationml/2006/main">
-  <p:cSld>
-    <p:spTree>
-      <p:nvGrpSpPr>
-        <p:cNvPr id="1" name=""/>
-        <p:cNvGrpSpPr/>
-        <p:nvPr/>
-      </p:nvGrpSpPr>
-      <p:grpSpPr>
-        <a:xfrm>
-          <a:off x="0" y="0"/>
-          <a:ext cx="0" cy="0"/>
-          <a:chOff x="0" y="0"/>
-          <a:chExt cx="0" cy="0"/>
-        </a:xfrm>
-      </p:grpSpPr>
-      <p:sp>
-        <p:nvSpPr>
-          <p:cNvPr id="3" name="Rectangle 65">
-            <a:extLst>
-              <a:ext uri="{FF2B5EF4-FFF2-40B4-BE49-F238E27FC236}">
-                <a16:creationId xmlns:a16="http://schemas.microsoft.com/office/drawing/2014/main" id="{50F43D07-3B7C-461A-A129-C563CD9C7AD5}"/>
-              </a:ext>
-            </a:extLst>
-          </p:cNvPr>
-          <p:cNvSpPr/>
-          <p:nvPr/>
-        </p:nvSpPr>
-        <p:spPr>
-          <a:xfrm>
-            <a:off x="1828800" y="1667338"/>
-            <a:ext cx="5410200" cy="2523662"/>
-          </a:xfrm>
-          <a:prstGeom prst="roundRect">
-            <a:avLst>
-              <a:gd name="adj" fmla="val 3484"/>
-            </a:avLst>
-          </a:prstGeom>
-          <a:solidFill>
-            <a:schemeClr val="accent1">
-              <a:lumMod val="20000"/>
-              <a:lumOff val="80000"/>
-            </a:schemeClr>
-          </a:solidFill>
-          <a:ln w="19050">
-            <a:noFill/>
-          </a:ln>
-          <a:effectLst/>
-        </p:spPr>
-        <p:style>
-          <a:lnRef idx="1">
-            <a:schemeClr val="accent2"/>
-          </a:lnRef>
-          <a:fillRef idx="2">
-            <a:schemeClr val="accent2"/>
-          </a:fillRef>
-          <a:effectRef idx="1">
-            <a:schemeClr val="accent2"/>
-          </a:effectRef>
-          <a:fontRef idx="minor">
-            <a:schemeClr val="dk1"/>
-          </a:fontRef>
-        </p:style>
-        <p:txBody>
-          <a:bodyPr rtlCol="0" anchor="t"/>
-          <a:lstStyle/>
-          <a:p>
-            <a:r>
-              <a:rPr lang="en-US" sz="1200" b="1" dirty="0">
-                <a:solidFill>
-                  <a:srgbClr val="0070C0"/>
-                </a:solidFill>
-              </a:rPr>
-              <a:t>UI</a:t>
-            </a:r>
-            <a:endParaRPr lang="en-SG" sz="1200" b="1" dirty="0">
-              <a:solidFill>
-                <a:srgbClr val="0070C0"/>
-              </a:solidFill>
-            </a:endParaRPr>
-          </a:p>
-        </p:txBody>
-      </p:sp>
-      <p:cxnSp>
-        <p:nvCxnSpPr>
-          <p:cNvPr id="5" name="Elbow Connector 95">
-            <a:extLst>
-              <a:ext uri="{FF2B5EF4-FFF2-40B4-BE49-F238E27FC236}">
-                <a16:creationId xmlns:a16="http://schemas.microsoft.com/office/drawing/2014/main" id="{AD9FDF45-FDBC-4875-96F7-03833ADB367A}"/>
-              </a:ext>
-            </a:extLst>
-          </p:cNvPr>
-          <p:cNvCxnSpPr>
-            <a:cxnSpLocks/>
-            <a:stCxn id="21" idx="3"/>
-          </p:cNvCxnSpPr>
-          <p:nvPr/>
-        </p:nvCxnSpPr>
-        <p:spPr>
-          <a:xfrm rot="10800000">
-            <a:off x="3581398" y="2846835"/>
-            <a:ext cx="1802503" cy="5787"/>
-          </a:xfrm>
-          <a:prstGeom prst="bentConnector3">
-            <a:avLst>
-              <a:gd name="adj1" fmla="val 50000"/>
-            </a:avLst>
-          </a:prstGeom>
-          <a:ln w="19050">
-            <a:headEnd type="none" w="med" len="med"/>
-            <a:tailEnd type="none" w="med" len="med"/>
-          </a:ln>
-        </p:spPr>
-        <p:style>
-          <a:lnRef idx="1">
-            <a:schemeClr val="accent1"/>
-          </a:lnRef>
-          <a:fillRef idx="0">
-            <a:schemeClr val="accent1"/>
-          </a:fillRef>
-          <a:effectRef idx="0">
-            <a:schemeClr val="accent1"/>
-          </a:effectRef>
-          <a:fontRef idx="minor">
-            <a:schemeClr val="tx1"/>
-          </a:fontRef>
-        </p:style>
-      </p:cxnSp>
-      <p:sp>
-        <p:nvSpPr>
-          <p:cNvPr id="16" name="Rectangle 11">
-            <a:extLst>
-              <a:ext uri="{FF2B5EF4-FFF2-40B4-BE49-F238E27FC236}">
-                <a16:creationId xmlns:a16="http://schemas.microsoft.com/office/drawing/2014/main" id="{50111C96-48AF-47D0-BB8C-97B8E0B4BD2F}"/>
-              </a:ext>
-            </a:extLst>
-          </p:cNvPr>
-          <p:cNvSpPr/>
-          <p:nvPr/>
-        </p:nvSpPr>
-        <p:spPr>
-          <a:xfrm flipH="1">
-            <a:off x="2110135" y="2667000"/>
-            <a:ext cx="1471264" cy="434423"/>
-          </a:xfrm>
-          <a:prstGeom prst="rect">
-            <a:avLst/>
-          </a:prstGeom>
-          <a:ln w="19050">
-            <a:solidFill>
-              <a:srgbClr val="0070C0"/>
-            </a:solidFill>
-          </a:ln>
-          <a:effectLst/>
-        </p:spPr>
-        <p:style>
-          <a:lnRef idx="1">
-            <a:schemeClr val="accent1"/>
-          </a:lnRef>
-          <a:fillRef idx="2">
-            <a:schemeClr val="accent1"/>
-          </a:fillRef>
-          <a:effectRef idx="1">
-            <a:schemeClr val="accent1"/>
-          </a:effectRef>
-          <a:fontRef idx="minor">
-            <a:schemeClr val="dk1"/>
-          </a:fontRef>
-        </p:style>
-        <p:txBody>
-          <a:bodyPr rtlCol="0" anchor="ctr"/>
-          <a:lstStyle/>
-          <a:p>
-            <a:pPr algn="ctr"/>
-            <a:r>
-              <a:rPr lang="en-US" sz="1050" b="1" dirty="0" err="1">
-                <a:solidFill>
-                  <a:srgbClr val="0070C0"/>
-                </a:solidFill>
-              </a:rPr>
-              <a:t>BirthdayStatisticsPanel</a:t>
-            </a:r>
-            <a:endParaRPr lang="en-US" sz="1050" b="1" dirty="0">
-              <a:solidFill>
-                <a:srgbClr val="0070C0"/>
-              </a:solidFill>
-            </a:endParaRPr>
-          </a:p>
-        </p:txBody>
-      </p:sp>
-      <p:sp>
-        <p:nvSpPr>
-          <p:cNvPr id="19" name="Rectangle 11">
-            <a:extLst>
-              <a:ext uri="{FF2B5EF4-FFF2-40B4-BE49-F238E27FC236}">
-                <a16:creationId xmlns:a16="http://schemas.microsoft.com/office/drawing/2014/main" id="{C8476C99-0F04-40C8-BFB1-165B0AC4C06F}"/>
-              </a:ext>
-            </a:extLst>
-          </p:cNvPr>
-          <p:cNvSpPr/>
-          <p:nvPr/>
-        </p:nvSpPr>
-        <p:spPr>
-          <a:xfrm flipH="1">
-            <a:off x="5628610" y="2667000"/>
-            <a:ext cx="1175194" cy="359669"/>
-          </a:xfrm>
-          <a:prstGeom prst="rect">
-            <a:avLst/>
-          </a:prstGeom>
-          <a:ln w="19050">
-            <a:solidFill>
-              <a:srgbClr val="0070C0"/>
-            </a:solidFill>
-          </a:ln>
-          <a:effectLst/>
-        </p:spPr>
-        <p:style>
-          <a:lnRef idx="1">
-            <a:schemeClr val="accent1"/>
-          </a:lnRef>
-          <a:fillRef idx="2">
-            <a:schemeClr val="accent1"/>
-          </a:fillRef>
-          <a:effectRef idx="1">
-            <a:schemeClr val="accent1"/>
-          </a:effectRef>
-          <a:fontRef idx="minor">
-            <a:schemeClr val="dk1"/>
-          </a:fontRef>
-        </p:style>
-        <p:txBody>
-          <a:bodyPr rtlCol="0" anchor="ctr"/>
-          <a:lstStyle/>
-          <a:p>
-            <a:pPr algn="ctr"/>
-            <a:r>
-              <a:rPr lang="en-SG" sz="1050" b="1" dirty="0">
-                <a:solidFill>
-                  <a:srgbClr val="0070C0"/>
-                </a:solidFill>
-              </a:rPr>
-              <a:t>{abstract}</a:t>
-            </a:r>
-          </a:p>
-          <a:p>
-            <a:pPr algn="ctr"/>
-            <a:r>
-              <a:rPr lang="en-SG" sz="1050" b="1" dirty="0" err="1">
-                <a:solidFill>
-                  <a:srgbClr val="0070C0"/>
-                </a:solidFill>
-              </a:rPr>
-              <a:t>UiPart</a:t>
-            </a:r>
-            <a:endParaRPr lang="en-US" sz="1050" b="1" dirty="0">
-              <a:solidFill>
-                <a:srgbClr val="0070C0"/>
-              </a:solidFill>
-            </a:endParaRPr>
-          </a:p>
-        </p:txBody>
-      </p:sp>
-      <p:sp>
-        <p:nvSpPr>
-          <p:cNvPr id="21" name="Isosceles Triangle 102">
-            <a:extLst>
-              <a:ext uri="{FF2B5EF4-FFF2-40B4-BE49-F238E27FC236}">
-                <a16:creationId xmlns:a16="http://schemas.microsoft.com/office/drawing/2014/main" id="{B2876B6D-F3D6-4937-AFDB-EE4ACF802C6D}"/>
-              </a:ext>
-            </a:extLst>
-          </p:cNvPr>
-          <p:cNvSpPr/>
-          <p:nvPr/>
-        </p:nvSpPr>
-        <p:spPr>
-          <a:xfrm rot="16200000" flipV="1">
-            <a:off x="5336409" y="2764859"/>
-            <a:ext cx="270504" cy="175523"/>
-          </a:xfrm>
-          <a:prstGeom prst="triangle">
-            <a:avLst/>
-          </a:prstGeom>
-          <a:solidFill>
-            <a:schemeClr val="tx2">
-              <a:lumMod val="60000"/>
-              <a:lumOff val="40000"/>
-            </a:schemeClr>
-          </a:solidFill>
-          <a:ln w="19050">
-            <a:solidFill>
-              <a:srgbClr val="0070C0"/>
-            </a:solidFill>
-          </a:ln>
-          <a:effectLst/>
-        </p:spPr>
-        <p:style>
-          <a:lnRef idx="1">
-            <a:schemeClr val="accent1"/>
-          </a:lnRef>
-          <a:fillRef idx="2">
-            <a:schemeClr val="accent1"/>
-          </a:fillRef>
-          <a:effectRef idx="1">
-            <a:schemeClr val="accent1"/>
-          </a:effectRef>
-          <a:fontRef idx="minor">
-            <a:schemeClr val="dk1"/>
-          </a:fontRef>
-        </p:style>
-        <p:txBody>
-          <a:bodyPr rtlCol="0" anchor="ctr"/>
-          <a:lstStyle/>
-          <a:p>
-            <a:pPr algn="ctr"/>
-            <a:endParaRPr lang="en-SG" sz="1050" b="1">
-              <a:solidFill>
-                <a:srgbClr val="92D050"/>
-              </a:solidFill>
-            </a:endParaRPr>
-          </a:p>
-        </p:txBody>
-      </p:sp>
-    </p:spTree>
-    <p:extLst>
-      <p:ext uri="{BB962C8B-B14F-4D97-AF65-F5344CB8AC3E}">
-        <p14:creationId xmlns:p14="http://schemas.microsoft.com/office/powerpoint/2010/main" val="2207275622"/>
       </p:ext>
     </p:extLst>
   </p:cSld>

</xml_diff>